<commit_message>
Finish dashboards and final steps
</commit_message>
<xml_diff>
--- a/LakeMeadWaterBankDivideInflow/ModelGuide/ModelGuideSlides.pptx
+++ b/LakeMeadWaterBankDivideInflow/ModelGuide/ModelGuideSlides.pptx
@@ -6,6 +6,7 @@
   </p:sldMasterIdLst>
   <p:sldIdLst>
     <p:sldId id="325" r:id="rId2"/>
+    <p:sldId id="326" r:id="rId3"/>
   </p:sldIdLst>
   <p:sldSz cx="12192000" cy="6858000"/>
   <p:notesSz cx="6858000" cy="9144000"/>
@@ -104,6 +105,11 @@
       </a:defRPr>
     </a:lvl9pPr>
   </p:defaultTextStyle>
+  <p:extLst>
+    <p:ext uri="{EFAFB233-063F-42B5-8137-9DF3F51BA10A}">
+      <p15:sldGuideLst xmlns:p15="http://schemas.microsoft.com/office/powerpoint/2012/main"/>
+    </p:ext>
+  </p:extLst>
 </p:presentation>
 </file>
 
@@ -254,7 +260,7 @@
           <a:p>
             <a:fld id="{1741EC50-43F3-4A5E-9366-58CA2B63D9FB}" type="datetimeFigureOut">
               <a:rPr lang="en-US" smtClean="0"/>
-              <a:t>10/17/2021</a:t>
+              <a:t>11/26/2024</a:t>
             </a:fld>
             <a:endParaRPr lang="en-US"/>
           </a:p>
@@ -452,7 +458,7 @@
           <a:p>
             <a:fld id="{1741EC50-43F3-4A5E-9366-58CA2B63D9FB}" type="datetimeFigureOut">
               <a:rPr lang="en-US" smtClean="0"/>
-              <a:t>10/17/2021</a:t>
+              <a:t>11/26/2024</a:t>
             </a:fld>
             <a:endParaRPr lang="en-US"/>
           </a:p>
@@ -660,7 +666,7 @@
           <a:p>
             <a:fld id="{1741EC50-43F3-4A5E-9366-58CA2B63D9FB}" type="datetimeFigureOut">
               <a:rPr lang="en-US" smtClean="0"/>
-              <a:t>10/17/2021</a:t>
+              <a:t>11/26/2024</a:t>
             </a:fld>
             <a:endParaRPr lang="en-US"/>
           </a:p>
@@ -858,7 +864,7 @@
           <a:p>
             <a:fld id="{1741EC50-43F3-4A5E-9366-58CA2B63D9FB}" type="datetimeFigureOut">
               <a:rPr lang="en-US" smtClean="0"/>
-              <a:t>10/17/2021</a:t>
+              <a:t>11/26/2024</a:t>
             </a:fld>
             <a:endParaRPr lang="en-US"/>
           </a:p>
@@ -1133,7 +1139,7 @@
           <a:p>
             <a:fld id="{1741EC50-43F3-4A5E-9366-58CA2B63D9FB}" type="datetimeFigureOut">
               <a:rPr lang="en-US" smtClean="0"/>
-              <a:t>10/17/2021</a:t>
+              <a:t>11/26/2024</a:t>
             </a:fld>
             <a:endParaRPr lang="en-US"/>
           </a:p>
@@ -1398,7 +1404,7 @@
           <a:p>
             <a:fld id="{1741EC50-43F3-4A5E-9366-58CA2B63D9FB}" type="datetimeFigureOut">
               <a:rPr lang="en-US" smtClean="0"/>
-              <a:t>10/17/2021</a:t>
+              <a:t>11/26/2024</a:t>
             </a:fld>
             <a:endParaRPr lang="en-US"/>
           </a:p>
@@ -1810,7 +1816,7 @@
           <a:p>
             <a:fld id="{1741EC50-43F3-4A5E-9366-58CA2B63D9FB}" type="datetimeFigureOut">
               <a:rPr lang="en-US" smtClean="0"/>
-              <a:t>10/17/2021</a:t>
+              <a:t>11/26/2024</a:t>
             </a:fld>
             <a:endParaRPr lang="en-US"/>
           </a:p>
@@ -1951,7 +1957,7 @@
           <a:p>
             <a:fld id="{1741EC50-43F3-4A5E-9366-58CA2B63D9FB}" type="datetimeFigureOut">
               <a:rPr lang="en-US" smtClean="0"/>
-              <a:t>10/17/2021</a:t>
+              <a:t>11/26/2024</a:t>
             </a:fld>
             <a:endParaRPr lang="en-US"/>
           </a:p>
@@ -2064,7 +2070,7 @@
           <a:p>
             <a:fld id="{1741EC50-43F3-4A5E-9366-58CA2B63D9FB}" type="datetimeFigureOut">
               <a:rPr lang="en-US" smtClean="0"/>
-              <a:t>10/17/2021</a:t>
+              <a:t>11/26/2024</a:t>
             </a:fld>
             <a:endParaRPr lang="en-US"/>
           </a:p>
@@ -2375,7 +2381,7 @@
           <a:p>
             <a:fld id="{1741EC50-43F3-4A5E-9366-58CA2B63D9FB}" type="datetimeFigureOut">
               <a:rPr lang="en-US" smtClean="0"/>
-              <a:t>10/17/2021</a:t>
+              <a:t>11/26/2024</a:t>
             </a:fld>
             <a:endParaRPr lang="en-US"/>
           </a:p>
@@ -2663,7 +2669,7 @@
           <a:p>
             <a:fld id="{1741EC50-43F3-4A5E-9366-58CA2B63D9FB}" type="datetimeFigureOut">
               <a:rPr lang="en-US" smtClean="0"/>
-              <a:t>10/17/2021</a:t>
+              <a:t>11/26/2024</a:t>
             </a:fld>
             <a:endParaRPr lang="en-US"/>
           </a:p>
@@ -2904,7 +2910,7 @@
           <a:p>
             <a:fld id="{1741EC50-43F3-4A5E-9366-58CA2B63D9FB}" type="datetimeFigureOut">
               <a:rPr lang="en-US" smtClean="0"/>
-              <a:t>10/17/2021</a:t>
+              <a:t>11/26/2024</a:t>
             </a:fld>
             <a:endParaRPr lang="en-US"/>
           </a:p>
@@ -3561,6 +3567,564 @@
 </p:sld>
 </file>
 
+<file path=ppt/slides/slide2.xml><?xml version="1.0" encoding="utf-8"?>
+<p:sld xmlns:a="http://schemas.openxmlformats.org/drawingml/2006/main" xmlns:r="http://schemas.openxmlformats.org/officeDocument/2006/relationships" xmlns:p="http://schemas.openxmlformats.org/presentationml/2006/main">
+  <p:cSld>
+    <p:spTree>
+      <p:nvGrpSpPr>
+        <p:cNvPr id="1" name="">
+          <a:extLst>
+            <a:ext uri="{FF2B5EF4-FFF2-40B4-BE49-F238E27FC236}">
+              <a16:creationId xmlns:a16="http://schemas.microsoft.com/office/drawing/2014/main" id="{C5EA863F-E9FC-12D1-F9AC-F03A09DAC0B3}"/>
+            </a:ext>
+          </a:extLst>
+        </p:cNvPr>
+        <p:cNvGrpSpPr/>
+        <p:nvPr/>
+      </p:nvGrpSpPr>
+      <p:grpSpPr>
+        <a:xfrm>
+          <a:off x="0" y="0"/>
+          <a:ext cx="0" cy="0"/>
+          <a:chOff x="0" y="0"/>
+          <a:chExt cx="0" cy="0"/>
+        </a:xfrm>
+      </p:grpSpPr>
+      <p:pic>
+        <p:nvPicPr>
+          <p:cNvPr id="6" name="Picture 5">
+            <a:extLst>
+              <a:ext uri="{FF2B5EF4-FFF2-40B4-BE49-F238E27FC236}">
+                <a16:creationId xmlns:a16="http://schemas.microsoft.com/office/drawing/2014/main" id="{6FC4219A-45A6-6ED7-5A0B-051E5C085433}"/>
+              </a:ext>
+            </a:extLst>
+          </p:cNvPr>
+          <p:cNvPicPr>
+            <a:picLocks noChangeAspect="1"/>
+          </p:cNvPicPr>
+          <p:nvPr/>
+        </p:nvPicPr>
+        <p:blipFill>
+          <a:blip r:embed="rId2"/>
+          <a:stretch>
+            <a:fillRect/>
+          </a:stretch>
+        </p:blipFill>
+        <p:spPr>
+          <a:xfrm>
+            <a:off x="463371" y="2112907"/>
+            <a:ext cx="6930657" cy="2429956"/>
+          </a:xfrm>
+          <a:prstGeom prst="rect">
+            <a:avLst/>
+          </a:prstGeom>
+        </p:spPr>
+      </p:pic>
+      <p:sp>
+        <p:nvSpPr>
+          <p:cNvPr id="7" name="TextBox 6">
+            <a:extLst>
+              <a:ext uri="{FF2B5EF4-FFF2-40B4-BE49-F238E27FC236}">
+                <a16:creationId xmlns:a16="http://schemas.microsoft.com/office/drawing/2014/main" id="{76722256-3F60-EA26-0299-8323C3BA2E26}"/>
+              </a:ext>
+            </a:extLst>
+          </p:cNvPr>
+          <p:cNvSpPr txBox="1"/>
+          <p:nvPr/>
+        </p:nvSpPr>
+        <p:spPr>
+          <a:xfrm>
+            <a:off x="7835965" y="1662927"/>
+            <a:ext cx="2393797" cy="369332"/>
+          </a:xfrm>
+          <a:prstGeom prst="rect">
+            <a:avLst/>
+          </a:prstGeom>
+          <a:noFill/>
+        </p:spPr>
+        <p:txBody>
+          <a:bodyPr wrap="none" rtlCol="0">
+            <a:spAutoFit/>
+          </a:bodyPr>
+          <a:lstStyle/>
+          <a:p>
+            <a:r>
+              <a:rPr lang="en-US" b="1" dirty="0">
+                <a:solidFill>
+                  <a:srgbClr val="0000FF"/>
+                </a:solidFill>
+              </a:rPr>
+              <a:t>a. Enter volume in </a:t>
+            </a:r>
+            <a:r>
+              <a:rPr lang="en-US" b="1" dirty="0" err="1">
+                <a:solidFill>
+                  <a:srgbClr val="0000FF"/>
+                </a:solidFill>
+              </a:rPr>
+              <a:t>maf</a:t>
+            </a:r>
+            <a:r>
+              <a:rPr lang="en-US" b="1" dirty="0">
+                <a:solidFill>
+                  <a:srgbClr val="0000FF"/>
+                </a:solidFill>
+              </a:rPr>
+              <a:t>.</a:t>
+            </a:r>
+          </a:p>
+        </p:txBody>
+      </p:sp>
+      <p:sp>
+        <p:nvSpPr>
+          <p:cNvPr id="8" name="TextBox 7">
+            <a:extLst>
+              <a:ext uri="{FF2B5EF4-FFF2-40B4-BE49-F238E27FC236}">
+                <a16:creationId xmlns:a16="http://schemas.microsoft.com/office/drawing/2014/main" id="{8D7CEEEE-EACA-BB29-1227-E27E9B1B8392}"/>
+              </a:ext>
+            </a:extLst>
+          </p:cNvPr>
+          <p:cNvSpPr txBox="1"/>
+          <p:nvPr/>
+        </p:nvSpPr>
+        <p:spPr>
+          <a:xfrm>
+            <a:off x="8043543" y="2098273"/>
+            <a:ext cx="3709650" cy="646331"/>
+          </a:xfrm>
+          <a:prstGeom prst="rect">
+            <a:avLst/>
+          </a:prstGeom>
+          <a:noFill/>
+        </p:spPr>
+        <p:txBody>
+          <a:bodyPr wrap="square" rtlCol="0">
+            <a:spAutoFit/>
+          </a:bodyPr>
+          <a:lstStyle/>
+          <a:p>
+            <a:r>
+              <a:rPr lang="en-US" b="1" dirty="0">
+                <a:solidFill>
+                  <a:srgbClr val="0000FF"/>
+                </a:solidFill>
+              </a:rPr>
+              <a:t>b. Enter compensation as formula = [Price][Volume] = [$/acre-foot][</a:t>
+            </a:r>
+            <a:r>
+              <a:rPr lang="en-US" b="1" dirty="0" err="1">
+                <a:solidFill>
+                  <a:srgbClr val="0000FF"/>
+                </a:solidFill>
+              </a:rPr>
+              <a:t>maf</a:t>
+            </a:r>
+            <a:r>
+              <a:rPr lang="en-US" b="1" dirty="0">
+                <a:solidFill>
+                  <a:srgbClr val="0000FF"/>
+                </a:solidFill>
+              </a:rPr>
+              <a:t>].</a:t>
+            </a:r>
+          </a:p>
+        </p:txBody>
+      </p:sp>
+      <p:sp>
+        <p:nvSpPr>
+          <p:cNvPr id="10" name="TextBox 9">
+            <a:extLst>
+              <a:ext uri="{FF2B5EF4-FFF2-40B4-BE49-F238E27FC236}">
+                <a16:creationId xmlns:a16="http://schemas.microsoft.com/office/drawing/2014/main" id="{7A60A588-F57A-C415-1B7F-1CD838A25B0F}"/>
+              </a:ext>
+            </a:extLst>
+          </p:cNvPr>
+          <p:cNvSpPr txBox="1"/>
+          <p:nvPr/>
+        </p:nvSpPr>
+        <p:spPr>
+          <a:xfrm>
+            <a:off x="8384317" y="4219698"/>
+            <a:ext cx="3065891" cy="646331"/>
+          </a:xfrm>
+          <a:prstGeom prst="rect">
+            <a:avLst/>
+          </a:prstGeom>
+          <a:noFill/>
+        </p:spPr>
+        <p:txBody>
+          <a:bodyPr wrap="square" rtlCol="0">
+            <a:spAutoFit/>
+          </a:bodyPr>
+          <a:lstStyle/>
+          <a:p>
+            <a:pPr algn="ctr"/>
+            <a:r>
+              <a:rPr lang="en-US" b="1" dirty="0">
+                <a:solidFill>
+                  <a:srgbClr val="0000FF"/>
+                </a:solidFill>
+              </a:rPr>
+              <a:t>c. Enter withdraw of consume volume.</a:t>
+            </a:r>
+          </a:p>
+        </p:txBody>
+      </p:sp>
+      <p:sp>
+        <p:nvSpPr>
+          <p:cNvPr id="14" name="TextBox 13">
+            <a:extLst>
+              <a:ext uri="{FF2B5EF4-FFF2-40B4-BE49-F238E27FC236}">
+                <a16:creationId xmlns:a16="http://schemas.microsoft.com/office/drawing/2014/main" id="{E0F33297-B96E-8174-B960-499C6BEB213A}"/>
+              </a:ext>
+            </a:extLst>
+          </p:cNvPr>
+          <p:cNvSpPr txBox="1"/>
+          <p:nvPr/>
+        </p:nvSpPr>
+        <p:spPr>
+          <a:xfrm>
+            <a:off x="8418222" y="2719576"/>
+            <a:ext cx="3065891" cy="646331"/>
+          </a:xfrm>
+          <a:prstGeom prst="rect">
+            <a:avLst/>
+          </a:prstGeom>
+          <a:noFill/>
+        </p:spPr>
+        <p:txBody>
+          <a:bodyPr wrap="square" rtlCol="0">
+            <a:spAutoFit/>
+          </a:bodyPr>
+          <a:lstStyle/>
+          <a:p>
+            <a:pPr algn="ctr"/>
+            <a:r>
+              <a:rPr lang="en-US" b="1" dirty="0">
+                <a:solidFill>
+                  <a:schemeClr val="accent2"/>
+                </a:solidFill>
+              </a:rPr>
+              <a:t>Track value. Is zero when each seller has a buyer.</a:t>
+            </a:r>
+          </a:p>
+        </p:txBody>
+      </p:sp>
+      <p:sp>
+        <p:nvSpPr>
+          <p:cNvPr id="15" name="TextBox 14">
+            <a:extLst>
+              <a:ext uri="{FF2B5EF4-FFF2-40B4-BE49-F238E27FC236}">
+                <a16:creationId xmlns:a16="http://schemas.microsoft.com/office/drawing/2014/main" id="{7B1E9B72-6E40-AEA7-B4D4-BD3A9CB11DCD}"/>
+              </a:ext>
+            </a:extLst>
+          </p:cNvPr>
+          <p:cNvSpPr txBox="1"/>
+          <p:nvPr/>
+        </p:nvSpPr>
+        <p:spPr>
+          <a:xfrm>
+            <a:off x="8418223" y="3435060"/>
+            <a:ext cx="3334970" cy="646331"/>
+          </a:xfrm>
+          <a:prstGeom prst="rect">
+            <a:avLst/>
+          </a:prstGeom>
+          <a:noFill/>
+        </p:spPr>
+        <p:txBody>
+          <a:bodyPr wrap="square" rtlCol="0">
+            <a:spAutoFit/>
+          </a:bodyPr>
+          <a:lstStyle/>
+          <a:p>
+            <a:pPr algn="ctr"/>
+            <a:r>
+              <a:rPr lang="en-US" b="1" dirty="0">
+                <a:solidFill>
+                  <a:schemeClr val="accent2"/>
+                </a:solidFill>
+              </a:rPr>
+              <a:t>Account balance. Water available to sell, withdraw, or consume.</a:t>
+            </a:r>
+          </a:p>
+        </p:txBody>
+      </p:sp>
+      <p:sp>
+        <p:nvSpPr>
+          <p:cNvPr id="16" name="TextBox 15">
+            <a:extLst>
+              <a:ext uri="{FF2B5EF4-FFF2-40B4-BE49-F238E27FC236}">
+                <a16:creationId xmlns:a16="http://schemas.microsoft.com/office/drawing/2014/main" id="{18F250C3-68E1-7949-6D12-AC382A734F05}"/>
+              </a:ext>
+            </a:extLst>
+          </p:cNvPr>
+          <p:cNvSpPr txBox="1"/>
+          <p:nvPr/>
+        </p:nvSpPr>
+        <p:spPr>
+          <a:xfrm>
+            <a:off x="7124948" y="5116709"/>
+            <a:ext cx="4359165" cy="369332"/>
+          </a:xfrm>
+          <a:prstGeom prst="rect">
+            <a:avLst/>
+          </a:prstGeom>
+          <a:noFill/>
+        </p:spPr>
+        <p:txBody>
+          <a:bodyPr wrap="square" rtlCol="0">
+            <a:spAutoFit/>
+          </a:bodyPr>
+          <a:lstStyle/>
+          <a:p>
+            <a:pPr algn="ctr"/>
+            <a:r>
+              <a:rPr lang="en-US" b="1" dirty="0">
+                <a:solidFill>
+                  <a:schemeClr val="accent2"/>
+                </a:solidFill>
+              </a:rPr>
+              <a:t>End Balance = Available water - Withdraw.</a:t>
+            </a:r>
+          </a:p>
+        </p:txBody>
+      </p:sp>
+      <p:cxnSp>
+        <p:nvCxnSpPr>
+          <p:cNvPr id="18" name="Straight Arrow Connector 17">
+            <a:extLst>
+              <a:ext uri="{FF2B5EF4-FFF2-40B4-BE49-F238E27FC236}">
+                <a16:creationId xmlns:a16="http://schemas.microsoft.com/office/drawing/2014/main" id="{283C634B-51D2-9847-7201-BDBA442D4360}"/>
+              </a:ext>
+            </a:extLst>
+          </p:cNvPr>
+          <p:cNvCxnSpPr>
+            <a:cxnSpLocks/>
+            <a:stCxn id="7" idx="1"/>
+          </p:cNvCxnSpPr>
+          <p:nvPr/>
+        </p:nvCxnSpPr>
+        <p:spPr>
+          <a:xfrm flipH="1">
+            <a:off x="7263437" y="1847593"/>
+            <a:ext cx="572528" cy="1027442"/>
+          </a:xfrm>
+          <a:prstGeom prst="straightConnector1">
+            <a:avLst/>
+          </a:prstGeom>
+          <a:ln w="28575">
+            <a:solidFill>
+              <a:srgbClr val="0000FF"/>
+            </a:solidFill>
+            <a:tailEnd type="triangle"/>
+          </a:ln>
+        </p:spPr>
+        <p:style>
+          <a:lnRef idx="1">
+            <a:schemeClr val="accent1"/>
+          </a:lnRef>
+          <a:fillRef idx="0">
+            <a:schemeClr val="accent1"/>
+          </a:fillRef>
+          <a:effectRef idx="0">
+            <a:schemeClr val="accent1"/>
+          </a:effectRef>
+          <a:fontRef idx="minor">
+            <a:schemeClr val="tx1"/>
+          </a:fontRef>
+        </p:style>
+      </p:cxnSp>
+      <p:cxnSp>
+        <p:nvCxnSpPr>
+          <p:cNvPr id="21" name="Straight Arrow Connector 20">
+            <a:extLst>
+              <a:ext uri="{FF2B5EF4-FFF2-40B4-BE49-F238E27FC236}">
+                <a16:creationId xmlns:a16="http://schemas.microsoft.com/office/drawing/2014/main" id="{CB525011-FE50-762E-0E85-D2FB8D2DE05C}"/>
+              </a:ext>
+            </a:extLst>
+          </p:cNvPr>
+          <p:cNvCxnSpPr>
+            <a:cxnSpLocks/>
+            <a:stCxn id="8" idx="1"/>
+          </p:cNvCxnSpPr>
+          <p:nvPr/>
+        </p:nvCxnSpPr>
+        <p:spPr>
+          <a:xfrm flipH="1">
+            <a:off x="7263437" y="2421439"/>
+            <a:ext cx="780106" cy="757714"/>
+          </a:xfrm>
+          <a:prstGeom prst="straightConnector1">
+            <a:avLst/>
+          </a:prstGeom>
+          <a:ln w="28575">
+            <a:solidFill>
+              <a:srgbClr val="0000FF"/>
+            </a:solidFill>
+            <a:tailEnd type="triangle"/>
+          </a:ln>
+        </p:spPr>
+        <p:style>
+          <a:lnRef idx="1">
+            <a:schemeClr val="accent1"/>
+          </a:lnRef>
+          <a:fillRef idx="0">
+            <a:schemeClr val="accent1"/>
+          </a:fillRef>
+          <a:effectRef idx="0">
+            <a:schemeClr val="accent1"/>
+          </a:effectRef>
+          <a:fontRef idx="minor">
+            <a:schemeClr val="tx1"/>
+          </a:fontRef>
+        </p:style>
+      </p:cxnSp>
+      <p:cxnSp>
+        <p:nvCxnSpPr>
+          <p:cNvPr id="24" name="Straight Arrow Connector 23">
+            <a:extLst>
+              <a:ext uri="{FF2B5EF4-FFF2-40B4-BE49-F238E27FC236}">
+                <a16:creationId xmlns:a16="http://schemas.microsoft.com/office/drawing/2014/main" id="{4535EA49-AC09-EA60-BCCE-375819B01CE1}"/>
+              </a:ext>
+            </a:extLst>
+          </p:cNvPr>
+          <p:cNvCxnSpPr>
+            <a:cxnSpLocks/>
+          </p:cNvCxnSpPr>
+          <p:nvPr/>
+        </p:nvCxnSpPr>
+        <p:spPr>
+          <a:xfrm flipH="1">
+            <a:off x="7263437" y="2895337"/>
+            <a:ext cx="1120880" cy="606982"/>
+          </a:xfrm>
+          <a:prstGeom prst="straightConnector1">
+            <a:avLst/>
+          </a:prstGeom>
+          <a:ln w="28575">
+            <a:solidFill>
+              <a:schemeClr val="accent2"/>
+            </a:solidFill>
+            <a:tailEnd type="triangle"/>
+          </a:ln>
+        </p:spPr>
+        <p:style>
+          <a:lnRef idx="1">
+            <a:schemeClr val="accent1"/>
+          </a:lnRef>
+          <a:fillRef idx="0">
+            <a:schemeClr val="accent1"/>
+          </a:fillRef>
+          <a:effectRef idx="0">
+            <a:schemeClr val="accent1"/>
+          </a:effectRef>
+          <a:fontRef idx="minor">
+            <a:schemeClr val="tx1"/>
+          </a:fontRef>
+        </p:style>
+      </p:cxnSp>
+      <p:cxnSp>
+        <p:nvCxnSpPr>
+          <p:cNvPr id="26" name="Straight Arrow Connector 25">
+            <a:extLst>
+              <a:ext uri="{FF2B5EF4-FFF2-40B4-BE49-F238E27FC236}">
+                <a16:creationId xmlns:a16="http://schemas.microsoft.com/office/drawing/2014/main" id="{311EE246-F247-98F9-8212-FDC7A58AE83D}"/>
+              </a:ext>
+            </a:extLst>
+          </p:cNvPr>
+          <p:cNvCxnSpPr>
+            <a:cxnSpLocks/>
+          </p:cNvCxnSpPr>
+          <p:nvPr/>
+        </p:nvCxnSpPr>
+        <p:spPr>
+          <a:xfrm flipH="1">
+            <a:off x="7263437" y="3659673"/>
+            <a:ext cx="1173681" cy="107960"/>
+          </a:xfrm>
+          <a:prstGeom prst="straightConnector1">
+            <a:avLst/>
+          </a:prstGeom>
+          <a:ln w="28575">
+            <a:solidFill>
+              <a:schemeClr val="accent2"/>
+            </a:solidFill>
+            <a:tailEnd type="triangle"/>
+          </a:ln>
+        </p:spPr>
+        <p:style>
+          <a:lnRef idx="1">
+            <a:schemeClr val="accent1"/>
+          </a:lnRef>
+          <a:fillRef idx="0">
+            <a:schemeClr val="accent1"/>
+          </a:fillRef>
+          <a:effectRef idx="0">
+            <a:schemeClr val="accent1"/>
+          </a:effectRef>
+          <a:fontRef idx="minor">
+            <a:schemeClr val="tx1"/>
+          </a:fontRef>
+        </p:style>
+      </p:cxnSp>
+      <p:cxnSp>
+        <p:nvCxnSpPr>
+          <p:cNvPr id="29" name="Straight Arrow Connector 28">
+            <a:extLst>
+              <a:ext uri="{FF2B5EF4-FFF2-40B4-BE49-F238E27FC236}">
+                <a16:creationId xmlns:a16="http://schemas.microsoft.com/office/drawing/2014/main" id="{D46437C1-437A-D311-DE9D-36ADA3E7B906}"/>
+              </a:ext>
+            </a:extLst>
+          </p:cNvPr>
+          <p:cNvCxnSpPr>
+            <a:cxnSpLocks/>
+          </p:cNvCxnSpPr>
+          <p:nvPr/>
+        </p:nvCxnSpPr>
+        <p:spPr>
+          <a:xfrm flipV="1">
+            <a:off x="7299913" y="4437615"/>
+            <a:ext cx="0" cy="643007"/>
+          </a:xfrm>
+          <a:prstGeom prst="straightConnector1">
+            <a:avLst/>
+          </a:prstGeom>
+          <a:ln w="28575">
+            <a:solidFill>
+              <a:schemeClr val="accent2"/>
+            </a:solidFill>
+            <a:tailEnd type="triangle"/>
+          </a:ln>
+        </p:spPr>
+        <p:style>
+          <a:lnRef idx="1">
+            <a:schemeClr val="accent1"/>
+          </a:lnRef>
+          <a:fillRef idx="0">
+            <a:schemeClr val="accent1"/>
+          </a:fillRef>
+          <a:effectRef idx="0">
+            <a:schemeClr val="accent1"/>
+          </a:effectRef>
+          <a:fontRef idx="minor">
+            <a:schemeClr val="tx1"/>
+          </a:fontRef>
+        </p:style>
+      </p:cxnSp>
+    </p:spTree>
+    <p:extLst>
+      <p:ext uri="{BB962C8B-B14F-4D97-AF65-F5344CB8AC3E}">
+        <p14:creationId xmlns:p14="http://schemas.microsoft.com/office/powerpoint/2010/main" val="1177683373"/>
+      </p:ext>
+    </p:extLst>
+  </p:cSld>
+  <p:clrMapOvr>
+    <a:masterClrMapping/>
+  </p:clrMapOvr>
+</p:sld>
+</file>
+
 <file path=ppt/theme/theme1.xml><?xml version="1.0" encoding="utf-8"?>
 <a:theme xmlns:a="http://schemas.openxmlformats.org/drawingml/2006/main" name="Office Theme">
   <a:themeElements>

</xml_diff>

<commit_message>
Update participant dashboard figure.
</commit_message>
<xml_diff>
--- a/LakeMeadWaterBankDivideInflow/ModelGuide/ModelGuideSlides.pptx
+++ b/LakeMeadWaterBankDivideInflow/ModelGuide/ModelGuideSlides.pptx
@@ -7,6 +7,7 @@
   <p:sldIdLst>
     <p:sldId id="325" r:id="rId2"/>
     <p:sldId id="326" r:id="rId3"/>
+    <p:sldId id="327" r:id="rId4"/>
   </p:sldIdLst>
   <p:sldSz cx="12192000" cy="6858000"/>
   <p:notesSz cx="6858000" cy="9144000"/>
@@ -260,7 +261,7 @@
           <a:p>
             <a:fld id="{1741EC50-43F3-4A5E-9366-58CA2B63D9FB}" type="datetimeFigureOut">
               <a:rPr lang="en-US" smtClean="0"/>
-              <a:t>6/25/25</a:t>
+              <a:t>7/11/2025</a:t>
             </a:fld>
             <a:endParaRPr lang="en-US"/>
           </a:p>
@@ -458,7 +459,7 @@
           <a:p>
             <a:fld id="{1741EC50-43F3-4A5E-9366-58CA2B63D9FB}" type="datetimeFigureOut">
               <a:rPr lang="en-US" smtClean="0"/>
-              <a:t>6/25/25</a:t>
+              <a:t>7/11/2025</a:t>
             </a:fld>
             <a:endParaRPr lang="en-US"/>
           </a:p>
@@ -666,7 +667,7 @@
           <a:p>
             <a:fld id="{1741EC50-43F3-4A5E-9366-58CA2B63D9FB}" type="datetimeFigureOut">
               <a:rPr lang="en-US" smtClean="0"/>
-              <a:t>6/25/25</a:t>
+              <a:t>7/11/2025</a:t>
             </a:fld>
             <a:endParaRPr lang="en-US"/>
           </a:p>
@@ -864,7 +865,7 @@
           <a:p>
             <a:fld id="{1741EC50-43F3-4A5E-9366-58CA2B63D9FB}" type="datetimeFigureOut">
               <a:rPr lang="en-US" smtClean="0"/>
-              <a:t>6/25/25</a:t>
+              <a:t>7/11/2025</a:t>
             </a:fld>
             <a:endParaRPr lang="en-US"/>
           </a:p>
@@ -1139,7 +1140,7 @@
           <a:p>
             <a:fld id="{1741EC50-43F3-4A5E-9366-58CA2B63D9FB}" type="datetimeFigureOut">
               <a:rPr lang="en-US" smtClean="0"/>
-              <a:t>6/25/25</a:t>
+              <a:t>7/11/2025</a:t>
             </a:fld>
             <a:endParaRPr lang="en-US"/>
           </a:p>
@@ -1404,7 +1405,7 @@
           <a:p>
             <a:fld id="{1741EC50-43F3-4A5E-9366-58CA2B63D9FB}" type="datetimeFigureOut">
               <a:rPr lang="en-US" smtClean="0"/>
-              <a:t>6/25/25</a:t>
+              <a:t>7/11/2025</a:t>
             </a:fld>
             <a:endParaRPr lang="en-US"/>
           </a:p>
@@ -1816,7 +1817,7 @@
           <a:p>
             <a:fld id="{1741EC50-43F3-4A5E-9366-58CA2B63D9FB}" type="datetimeFigureOut">
               <a:rPr lang="en-US" smtClean="0"/>
-              <a:t>6/25/25</a:t>
+              <a:t>7/11/2025</a:t>
             </a:fld>
             <a:endParaRPr lang="en-US"/>
           </a:p>
@@ -1957,7 +1958,7 @@
           <a:p>
             <a:fld id="{1741EC50-43F3-4A5E-9366-58CA2B63D9FB}" type="datetimeFigureOut">
               <a:rPr lang="en-US" smtClean="0"/>
-              <a:t>6/25/25</a:t>
+              <a:t>7/11/2025</a:t>
             </a:fld>
             <a:endParaRPr lang="en-US"/>
           </a:p>
@@ -2070,7 +2071,7 @@
           <a:p>
             <a:fld id="{1741EC50-43F3-4A5E-9366-58CA2B63D9FB}" type="datetimeFigureOut">
               <a:rPr lang="en-US" smtClean="0"/>
-              <a:t>6/25/25</a:t>
+              <a:t>7/11/2025</a:t>
             </a:fld>
             <a:endParaRPr lang="en-US"/>
           </a:p>
@@ -2381,7 +2382,7 @@
           <a:p>
             <a:fld id="{1741EC50-43F3-4A5E-9366-58CA2B63D9FB}" type="datetimeFigureOut">
               <a:rPr lang="en-US" smtClean="0"/>
-              <a:t>6/25/25</a:t>
+              <a:t>7/11/2025</a:t>
             </a:fld>
             <a:endParaRPr lang="en-US"/>
           </a:p>
@@ -2669,7 +2670,7 @@
           <a:p>
             <a:fld id="{1741EC50-43F3-4A5E-9366-58CA2B63D9FB}" type="datetimeFigureOut">
               <a:rPr lang="en-US" smtClean="0"/>
-              <a:t>6/25/25</a:t>
+              <a:t>7/11/2025</a:t>
             </a:fld>
             <a:endParaRPr lang="en-US"/>
           </a:p>
@@ -2910,7 +2911,7 @@
           <a:p>
             <a:fld id="{1741EC50-43F3-4A5E-9366-58CA2B63D9FB}" type="datetimeFigureOut">
               <a:rPr lang="en-US" smtClean="0"/>
-              <a:t>6/25/25</a:t>
+              <a:t>7/11/2025</a:t>
             </a:fld>
             <a:endParaRPr lang="en-US"/>
           </a:p>
@@ -3639,6 +3640,703 @@
 </p:sld>
 </file>
 
+<file path=ppt/slides/slide3.xml><?xml version="1.0" encoding="utf-8"?>
+<p:sld xmlns:a="http://schemas.openxmlformats.org/drawingml/2006/main" xmlns:r="http://schemas.openxmlformats.org/officeDocument/2006/relationships" xmlns:p="http://schemas.openxmlformats.org/presentationml/2006/main">
+  <p:cSld>
+    <p:spTree>
+      <p:nvGrpSpPr>
+        <p:cNvPr id="1" name="">
+          <a:extLst>
+            <a:ext uri="{FF2B5EF4-FFF2-40B4-BE49-F238E27FC236}">
+              <a16:creationId xmlns:a16="http://schemas.microsoft.com/office/drawing/2014/main" id="{4BD3BAFF-1CB4-03E0-141C-96D0747B368D}"/>
+            </a:ext>
+          </a:extLst>
+        </p:cNvPr>
+        <p:cNvGrpSpPr/>
+        <p:nvPr/>
+      </p:nvGrpSpPr>
+      <p:grpSpPr>
+        <a:xfrm>
+          <a:off x="0" y="0"/>
+          <a:ext cx="0" cy="0"/>
+          <a:chOff x="0" y="0"/>
+          <a:chExt cx="0" cy="0"/>
+        </a:xfrm>
+      </p:grpSpPr>
+      <p:pic>
+        <p:nvPicPr>
+          <p:cNvPr id="4" name="Picture 3">
+            <a:extLst>
+              <a:ext uri="{FF2B5EF4-FFF2-40B4-BE49-F238E27FC236}">
+                <a16:creationId xmlns:a16="http://schemas.microsoft.com/office/drawing/2014/main" id="{6C655AEB-9756-E0E8-2EC0-3E17D78D96CB}"/>
+              </a:ext>
+            </a:extLst>
+          </p:cNvPr>
+          <p:cNvPicPr>
+            <a:picLocks noChangeAspect="1"/>
+          </p:cNvPicPr>
+          <p:nvPr/>
+        </p:nvPicPr>
+        <p:blipFill>
+          <a:blip r:embed="rId2"/>
+          <a:stretch>
+            <a:fillRect/>
+          </a:stretch>
+        </p:blipFill>
+        <p:spPr>
+          <a:xfrm>
+            <a:off x="522994" y="2521214"/>
+            <a:ext cx="5748333" cy="2075572"/>
+          </a:xfrm>
+          <a:prstGeom prst="rect">
+            <a:avLst/>
+          </a:prstGeom>
+          <a:ln>
+            <a:solidFill>
+              <a:schemeClr val="tx1"/>
+            </a:solidFill>
+          </a:ln>
+        </p:spPr>
+      </p:pic>
+      <p:sp>
+        <p:nvSpPr>
+          <p:cNvPr id="5" name="TextBox 4">
+            <a:extLst>
+              <a:ext uri="{FF2B5EF4-FFF2-40B4-BE49-F238E27FC236}">
+                <a16:creationId xmlns:a16="http://schemas.microsoft.com/office/drawing/2014/main" id="{A785745D-A98E-29A4-CD42-35B63071D172}"/>
+              </a:ext>
+            </a:extLst>
+          </p:cNvPr>
+          <p:cNvSpPr txBox="1"/>
+          <p:nvPr/>
+        </p:nvSpPr>
+        <p:spPr>
+          <a:xfrm>
+            <a:off x="6721338" y="1865459"/>
+            <a:ext cx="2556854" cy="369332"/>
+          </a:xfrm>
+          <a:prstGeom prst="rect">
+            <a:avLst/>
+          </a:prstGeom>
+          <a:noFill/>
+        </p:spPr>
+        <p:txBody>
+          <a:bodyPr wrap="none" rtlCol="0">
+            <a:spAutoFit/>
+          </a:bodyPr>
+          <a:lstStyle/>
+          <a:p>
+            <a:r>
+              <a:rPr lang="en-US" b="1" dirty="0">
+                <a:solidFill>
+                  <a:srgbClr val="0000FF"/>
+                </a:solidFill>
+              </a:rPr>
+              <a:t>a. Enter volume in [</a:t>
+            </a:r>
+            <a:r>
+              <a:rPr lang="en-US" b="1" dirty="0" err="1">
+                <a:solidFill>
+                  <a:srgbClr val="0000FF"/>
+                </a:solidFill>
+              </a:rPr>
+              <a:t>maf</a:t>
+            </a:r>
+            <a:r>
+              <a:rPr lang="en-US" b="1" dirty="0">
+                <a:solidFill>
+                  <a:srgbClr val="0000FF"/>
+                </a:solidFill>
+              </a:rPr>
+              <a:t>].</a:t>
+            </a:r>
+          </a:p>
+        </p:txBody>
+      </p:sp>
+      <p:sp>
+        <p:nvSpPr>
+          <p:cNvPr id="6" name="TextBox 5">
+            <a:extLst>
+              <a:ext uri="{FF2B5EF4-FFF2-40B4-BE49-F238E27FC236}">
+                <a16:creationId xmlns:a16="http://schemas.microsoft.com/office/drawing/2014/main" id="{7D03BEB5-B431-672F-9F6F-9C980DDF1CF3}"/>
+              </a:ext>
+            </a:extLst>
+          </p:cNvPr>
+          <p:cNvSpPr txBox="1"/>
+          <p:nvPr/>
+        </p:nvSpPr>
+        <p:spPr>
+          <a:xfrm>
+            <a:off x="6897701" y="2237007"/>
+            <a:ext cx="3035831" cy="369332"/>
+          </a:xfrm>
+          <a:prstGeom prst="rect">
+            <a:avLst/>
+          </a:prstGeom>
+          <a:noFill/>
+        </p:spPr>
+        <p:txBody>
+          <a:bodyPr wrap="none" rtlCol="0">
+            <a:spAutoFit/>
+          </a:bodyPr>
+          <a:lstStyle/>
+          <a:p>
+            <a:r>
+              <a:rPr lang="en-US" b="1" dirty="0">
+                <a:solidFill>
+                  <a:srgbClr val="0000FF"/>
+                </a:solidFill>
+              </a:rPr>
+              <a:t>b. Enter price in [$/acre-foot].</a:t>
+            </a:r>
+          </a:p>
+        </p:txBody>
+      </p:sp>
+      <p:sp>
+        <p:nvSpPr>
+          <p:cNvPr id="7" name="TextBox 6">
+            <a:extLst>
+              <a:ext uri="{FF2B5EF4-FFF2-40B4-BE49-F238E27FC236}">
+                <a16:creationId xmlns:a16="http://schemas.microsoft.com/office/drawing/2014/main" id="{62D3E363-BDE4-0851-778B-537551931A84}"/>
+              </a:ext>
+            </a:extLst>
+          </p:cNvPr>
+          <p:cNvSpPr txBox="1"/>
+          <p:nvPr/>
+        </p:nvSpPr>
+        <p:spPr>
+          <a:xfrm>
+            <a:off x="7199502" y="2647089"/>
+            <a:ext cx="4469504" cy="923330"/>
+          </a:xfrm>
+          <a:prstGeom prst="rect">
+            <a:avLst/>
+          </a:prstGeom>
+          <a:noFill/>
+        </p:spPr>
+        <p:txBody>
+          <a:bodyPr wrap="square" rtlCol="0">
+            <a:spAutoFit/>
+          </a:bodyPr>
+          <a:lstStyle/>
+          <a:p>
+            <a:pPr marL="339725" indent="-339725"/>
+            <a:r>
+              <a:rPr lang="en-US" b="1" dirty="0">
+                <a:solidFill>
+                  <a:srgbClr val="FF9900"/>
+                </a:solidFill>
+              </a:rPr>
+              <a:t>c. Compensation will automatically populate.</a:t>
+            </a:r>
+          </a:p>
+          <a:p>
+            <a:pPr marL="227013"/>
+            <a:r>
+              <a:rPr lang="en-US" b="1" dirty="0">
+                <a:solidFill>
+                  <a:srgbClr val="FF9900"/>
+                </a:solidFill>
+              </a:rPr>
+              <a:t>Compensation = [Price][Volume]</a:t>
+            </a:r>
+          </a:p>
+          <a:p>
+            <a:pPr marL="227013"/>
+            <a:r>
+              <a:rPr lang="en-US" b="1" dirty="0">
+                <a:solidFill>
+                  <a:srgbClr val="FF9900"/>
+                </a:solidFill>
+              </a:rPr>
+              <a:t>	= [$ Million].</a:t>
+            </a:r>
+          </a:p>
+        </p:txBody>
+      </p:sp>
+      <p:sp>
+        <p:nvSpPr>
+          <p:cNvPr id="8" name="TextBox 7">
+            <a:extLst>
+              <a:ext uri="{FF2B5EF4-FFF2-40B4-BE49-F238E27FC236}">
+                <a16:creationId xmlns:a16="http://schemas.microsoft.com/office/drawing/2014/main" id="{EA2627FF-43E5-A43C-EB41-70782F9101F8}"/>
+              </a:ext>
+            </a:extLst>
+          </p:cNvPr>
+          <p:cNvSpPr txBox="1"/>
+          <p:nvPr/>
+        </p:nvSpPr>
+        <p:spPr>
+          <a:xfrm>
+            <a:off x="7172799" y="3651920"/>
+            <a:ext cx="3440463" cy="646331"/>
+          </a:xfrm>
+          <a:prstGeom prst="rect">
+            <a:avLst/>
+          </a:prstGeom>
+          <a:noFill/>
+        </p:spPr>
+        <p:txBody>
+          <a:bodyPr wrap="square" rtlCol="0">
+            <a:spAutoFit/>
+          </a:bodyPr>
+          <a:lstStyle/>
+          <a:p>
+            <a:pPr marL="339725" indent="-339725" algn="ctr"/>
+            <a:r>
+              <a:rPr lang="en-US" b="1" dirty="0">
+                <a:solidFill>
+                  <a:srgbClr val="FF9900"/>
+                </a:solidFill>
+              </a:rPr>
+              <a:t>d. Track value. Is zero when each buyer has a seller.</a:t>
+            </a:r>
+          </a:p>
+        </p:txBody>
+      </p:sp>
+      <p:sp>
+        <p:nvSpPr>
+          <p:cNvPr id="9" name="TextBox 8">
+            <a:extLst>
+              <a:ext uri="{FF2B5EF4-FFF2-40B4-BE49-F238E27FC236}">
+                <a16:creationId xmlns:a16="http://schemas.microsoft.com/office/drawing/2014/main" id="{DB469A0D-FB7B-E352-AF5A-73D4B25CD64C}"/>
+              </a:ext>
+            </a:extLst>
+          </p:cNvPr>
+          <p:cNvSpPr txBox="1"/>
+          <p:nvPr/>
+        </p:nvSpPr>
+        <p:spPr>
+          <a:xfrm>
+            <a:off x="7199502" y="4379752"/>
+            <a:ext cx="3838034" cy="646331"/>
+          </a:xfrm>
+          <a:prstGeom prst="rect">
+            <a:avLst/>
+          </a:prstGeom>
+          <a:noFill/>
+        </p:spPr>
+        <p:txBody>
+          <a:bodyPr wrap="square" rtlCol="0">
+            <a:spAutoFit/>
+          </a:bodyPr>
+          <a:lstStyle/>
+          <a:p>
+            <a:pPr marL="339725" indent="-339725" algn="ctr"/>
+            <a:r>
+              <a:rPr lang="en-US" b="1" dirty="0">
+                <a:solidFill>
+                  <a:srgbClr val="FF9900"/>
+                </a:solidFill>
+              </a:rPr>
+              <a:t>e. Account balance. Water available to sell, consume, or conserve.</a:t>
+            </a:r>
+          </a:p>
+        </p:txBody>
+      </p:sp>
+      <p:sp>
+        <p:nvSpPr>
+          <p:cNvPr id="10" name="TextBox 9">
+            <a:extLst>
+              <a:ext uri="{FF2B5EF4-FFF2-40B4-BE49-F238E27FC236}">
+                <a16:creationId xmlns:a16="http://schemas.microsoft.com/office/drawing/2014/main" id="{484A7085-F263-1FB5-C40E-897EA57D51FA}"/>
+              </a:ext>
+            </a:extLst>
+          </p:cNvPr>
+          <p:cNvSpPr txBox="1"/>
+          <p:nvPr/>
+        </p:nvSpPr>
+        <p:spPr>
+          <a:xfrm>
+            <a:off x="6942966" y="5217648"/>
+            <a:ext cx="4242636" cy="369332"/>
+          </a:xfrm>
+          <a:prstGeom prst="rect">
+            <a:avLst/>
+          </a:prstGeom>
+          <a:noFill/>
+        </p:spPr>
+        <p:txBody>
+          <a:bodyPr wrap="none" rtlCol="0">
+            <a:spAutoFit/>
+          </a:bodyPr>
+          <a:lstStyle/>
+          <a:p>
+            <a:r>
+              <a:rPr lang="en-US" b="1" dirty="0">
+                <a:solidFill>
+                  <a:srgbClr val="0000FF"/>
+                </a:solidFill>
+              </a:rPr>
+              <a:t>f. Enter volume to withdraw and consume.</a:t>
+            </a:r>
+          </a:p>
+        </p:txBody>
+      </p:sp>
+      <p:sp>
+        <p:nvSpPr>
+          <p:cNvPr id="11" name="TextBox 10">
+            <a:extLst>
+              <a:ext uri="{FF2B5EF4-FFF2-40B4-BE49-F238E27FC236}">
+                <a16:creationId xmlns:a16="http://schemas.microsoft.com/office/drawing/2014/main" id="{42E0638A-78CC-231B-18EF-BB25380930AE}"/>
+              </a:ext>
+            </a:extLst>
+          </p:cNvPr>
+          <p:cNvSpPr txBox="1"/>
+          <p:nvPr/>
+        </p:nvSpPr>
+        <p:spPr>
+          <a:xfrm>
+            <a:off x="6493069" y="5668481"/>
+            <a:ext cx="3440463" cy="646331"/>
+          </a:xfrm>
+          <a:prstGeom prst="rect">
+            <a:avLst/>
+          </a:prstGeom>
+          <a:noFill/>
+        </p:spPr>
+        <p:txBody>
+          <a:bodyPr wrap="square" rtlCol="0">
+            <a:spAutoFit/>
+          </a:bodyPr>
+          <a:lstStyle/>
+          <a:p>
+            <a:pPr marL="339725" indent="-339725" algn="ctr"/>
+            <a:r>
+              <a:rPr lang="en-US" b="1" dirty="0">
+                <a:solidFill>
+                  <a:srgbClr val="FF9900"/>
+                </a:solidFill>
+              </a:rPr>
+              <a:t>g. End balance = Available water - Withdraw.</a:t>
+            </a:r>
+          </a:p>
+        </p:txBody>
+      </p:sp>
+      <p:cxnSp>
+        <p:nvCxnSpPr>
+          <p:cNvPr id="13" name="Straight Arrow Connector 12">
+            <a:extLst>
+              <a:ext uri="{FF2B5EF4-FFF2-40B4-BE49-F238E27FC236}">
+                <a16:creationId xmlns:a16="http://schemas.microsoft.com/office/drawing/2014/main" id="{51C40484-719B-9D26-0887-AF7B3F14EFC4}"/>
+              </a:ext>
+            </a:extLst>
+          </p:cNvPr>
+          <p:cNvCxnSpPr>
+            <a:cxnSpLocks/>
+          </p:cNvCxnSpPr>
+          <p:nvPr/>
+        </p:nvCxnSpPr>
+        <p:spPr>
+          <a:xfrm flipH="1">
+            <a:off x="6154824" y="2168665"/>
+            <a:ext cx="566514" cy="946769"/>
+          </a:xfrm>
+          <a:prstGeom prst="straightConnector1">
+            <a:avLst/>
+          </a:prstGeom>
+          <a:ln w="19050">
+            <a:solidFill>
+              <a:srgbClr val="0000FF"/>
+            </a:solidFill>
+            <a:tailEnd type="triangle"/>
+          </a:ln>
+        </p:spPr>
+        <p:style>
+          <a:lnRef idx="1">
+            <a:schemeClr val="accent1"/>
+          </a:lnRef>
+          <a:fillRef idx="0">
+            <a:schemeClr val="accent1"/>
+          </a:fillRef>
+          <a:effectRef idx="0">
+            <a:schemeClr val="accent1"/>
+          </a:effectRef>
+          <a:fontRef idx="minor">
+            <a:schemeClr val="tx1"/>
+          </a:fontRef>
+        </p:style>
+      </p:cxnSp>
+      <p:cxnSp>
+        <p:nvCxnSpPr>
+          <p:cNvPr id="14" name="Straight Arrow Connector 13">
+            <a:extLst>
+              <a:ext uri="{FF2B5EF4-FFF2-40B4-BE49-F238E27FC236}">
+                <a16:creationId xmlns:a16="http://schemas.microsoft.com/office/drawing/2014/main" id="{614331FF-AFC7-66AB-17BF-5A7FE9F6D5C1}"/>
+              </a:ext>
+            </a:extLst>
+          </p:cNvPr>
+          <p:cNvCxnSpPr>
+            <a:cxnSpLocks/>
+            <a:stCxn id="6" idx="1"/>
+          </p:cNvCxnSpPr>
+          <p:nvPr/>
+        </p:nvCxnSpPr>
+        <p:spPr>
+          <a:xfrm flipH="1">
+            <a:off x="6154824" y="2421673"/>
+            <a:ext cx="742877" cy="922184"/>
+          </a:xfrm>
+          <a:prstGeom prst="straightConnector1">
+            <a:avLst/>
+          </a:prstGeom>
+          <a:ln w="19050">
+            <a:solidFill>
+              <a:srgbClr val="0000FF"/>
+            </a:solidFill>
+            <a:tailEnd type="triangle"/>
+          </a:ln>
+        </p:spPr>
+        <p:style>
+          <a:lnRef idx="1">
+            <a:schemeClr val="accent1"/>
+          </a:lnRef>
+          <a:fillRef idx="0">
+            <a:schemeClr val="accent1"/>
+          </a:fillRef>
+          <a:effectRef idx="0">
+            <a:schemeClr val="accent1"/>
+          </a:effectRef>
+          <a:fontRef idx="minor">
+            <a:schemeClr val="tx1"/>
+          </a:fontRef>
+        </p:style>
+      </p:cxnSp>
+      <p:cxnSp>
+        <p:nvCxnSpPr>
+          <p:cNvPr id="20" name="Straight Arrow Connector 19">
+            <a:extLst>
+              <a:ext uri="{FF2B5EF4-FFF2-40B4-BE49-F238E27FC236}">
+                <a16:creationId xmlns:a16="http://schemas.microsoft.com/office/drawing/2014/main" id="{32B175C9-3AA8-1718-A8F9-52A04B266BC2}"/>
+              </a:ext>
+            </a:extLst>
+          </p:cNvPr>
+          <p:cNvCxnSpPr>
+            <a:cxnSpLocks/>
+            <a:endCxn id="4" idx="3"/>
+          </p:cNvCxnSpPr>
+          <p:nvPr/>
+        </p:nvCxnSpPr>
+        <p:spPr>
+          <a:xfrm flipH="1">
+            <a:off x="6271327" y="2882765"/>
+            <a:ext cx="928175" cy="676235"/>
+          </a:xfrm>
+          <a:prstGeom prst="straightConnector1">
+            <a:avLst/>
+          </a:prstGeom>
+          <a:ln w="19050">
+            <a:solidFill>
+              <a:srgbClr val="FF9900"/>
+            </a:solidFill>
+            <a:tailEnd type="triangle"/>
+          </a:ln>
+        </p:spPr>
+        <p:style>
+          <a:lnRef idx="1">
+            <a:schemeClr val="accent1"/>
+          </a:lnRef>
+          <a:fillRef idx="0">
+            <a:schemeClr val="accent1"/>
+          </a:fillRef>
+          <a:effectRef idx="0">
+            <a:schemeClr val="accent1"/>
+          </a:effectRef>
+          <a:fontRef idx="minor">
+            <a:schemeClr val="tx1"/>
+          </a:fontRef>
+        </p:style>
+      </p:cxnSp>
+      <p:cxnSp>
+        <p:nvCxnSpPr>
+          <p:cNvPr id="23" name="Straight Arrow Connector 22">
+            <a:extLst>
+              <a:ext uri="{FF2B5EF4-FFF2-40B4-BE49-F238E27FC236}">
+                <a16:creationId xmlns:a16="http://schemas.microsoft.com/office/drawing/2014/main" id="{6F049BB4-7D59-AE72-63CB-BFFAC27CA1CF}"/>
+              </a:ext>
+            </a:extLst>
+          </p:cNvPr>
+          <p:cNvCxnSpPr>
+            <a:cxnSpLocks/>
+          </p:cNvCxnSpPr>
+          <p:nvPr/>
+        </p:nvCxnSpPr>
+        <p:spPr>
+          <a:xfrm flipH="1" flipV="1">
+            <a:off x="6213075" y="3815102"/>
+            <a:ext cx="986427" cy="16955"/>
+          </a:xfrm>
+          <a:prstGeom prst="straightConnector1">
+            <a:avLst/>
+          </a:prstGeom>
+          <a:ln w="19050">
+            <a:solidFill>
+              <a:srgbClr val="FF9900"/>
+            </a:solidFill>
+            <a:tailEnd type="triangle"/>
+          </a:ln>
+        </p:spPr>
+        <p:style>
+          <a:lnRef idx="1">
+            <a:schemeClr val="accent1"/>
+          </a:lnRef>
+          <a:fillRef idx="0">
+            <a:schemeClr val="accent1"/>
+          </a:fillRef>
+          <a:effectRef idx="0">
+            <a:schemeClr val="accent1"/>
+          </a:effectRef>
+          <a:fontRef idx="minor">
+            <a:schemeClr val="tx1"/>
+          </a:fontRef>
+        </p:style>
+      </p:cxnSp>
+      <p:cxnSp>
+        <p:nvCxnSpPr>
+          <p:cNvPr id="26" name="Straight Arrow Connector 25">
+            <a:extLst>
+              <a:ext uri="{FF2B5EF4-FFF2-40B4-BE49-F238E27FC236}">
+                <a16:creationId xmlns:a16="http://schemas.microsoft.com/office/drawing/2014/main" id="{9E1090B9-B14E-F5E0-6041-ECDB30BB7AE5}"/>
+              </a:ext>
+            </a:extLst>
+          </p:cNvPr>
+          <p:cNvCxnSpPr>
+            <a:cxnSpLocks/>
+          </p:cNvCxnSpPr>
+          <p:nvPr/>
+        </p:nvCxnSpPr>
+        <p:spPr>
+          <a:xfrm flipH="1" flipV="1">
+            <a:off x="6186372" y="4033186"/>
+            <a:ext cx="1013130" cy="543877"/>
+          </a:xfrm>
+          <a:prstGeom prst="straightConnector1">
+            <a:avLst/>
+          </a:prstGeom>
+          <a:ln w="19050">
+            <a:solidFill>
+              <a:srgbClr val="FF9900"/>
+            </a:solidFill>
+            <a:tailEnd type="triangle"/>
+          </a:ln>
+        </p:spPr>
+        <p:style>
+          <a:lnRef idx="1">
+            <a:schemeClr val="accent1"/>
+          </a:lnRef>
+          <a:fillRef idx="0">
+            <a:schemeClr val="accent1"/>
+          </a:fillRef>
+          <a:effectRef idx="0">
+            <a:schemeClr val="accent1"/>
+          </a:effectRef>
+          <a:fontRef idx="minor">
+            <a:schemeClr val="tx1"/>
+          </a:fontRef>
+        </p:style>
+      </p:cxnSp>
+      <p:cxnSp>
+        <p:nvCxnSpPr>
+          <p:cNvPr id="28" name="Straight Arrow Connector 27">
+            <a:extLst>
+              <a:ext uri="{FF2B5EF4-FFF2-40B4-BE49-F238E27FC236}">
+                <a16:creationId xmlns:a16="http://schemas.microsoft.com/office/drawing/2014/main" id="{E6FC8EDB-0045-8375-1FFC-4749974C1DD5}"/>
+              </a:ext>
+            </a:extLst>
+          </p:cNvPr>
+          <p:cNvCxnSpPr>
+            <a:cxnSpLocks/>
+          </p:cNvCxnSpPr>
+          <p:nvPr/>
+        </p:nvCxnSpPr>
+        <p:spPr>
+          <a:xfrm flipH="1" flipV="1">
+            <a:off x="5963830" y="4594018"/>
+            <a:ext cx="624426" cy="1184462"/>
+          </a:xfrm>
+          <a:prstGeom prst="straightConnector1">
+            <a:avLst/>
+          </a:prstGeom>
+          <a:ln w="19050">
+            <a:solidFill>
+              <a:srgbClr val="FF9900"/>
+            </a:solidFill>
+            <a:tailEnd type="triangle"/>
+          </a:ln>
+        </p:spPr>
+        <p:style>
+          <a:lnRef idx="1">
+            <a:schemeClr val="accent1"/>
+          </a:lnRef>
+          <a:fillRef idx="0">
+            <a:schemeClr val="accent1"/>
+          </a:fillRef>
+          <a:effectRef idx="0">
+            <a:schemeClr val="accent1"/>
+          </a:effectRef>
+          <a:fontRef idx="minor">
+            <a:schemeClr val="tx1"/>
+          </a:fontRef>
+        </p:style>
+      </p:cxnSp>
+      <p:cxnSp>
+        <p:nvCxnSpPr>
+          <p:cNvPr id="30" name="Straight Arrow Connector 29">
+            <a:extLst>
+              <a:ext uri="{FF2B5EF4-FFF2-40B4-BE49-F238E27FC236}">
+                <a16:creationId xmlns:a16="http://schemas.microsoft.com/office/drawing/2014/main" id="{13944708-1DF0-9699-4DB8-1E61ED367BFA}"/>
+              </a:ext>
+            </a:extLst>
+          </p:cNvPr>
+          <p:cNvCxnSpPr>
+            <a:cxnSpLocks/>
+            <a:stCxn id="10" idx="1"/>
+          </p:cNvCxnSpPr>
+          <p:nvPr/>
+        </p:nvCxnSpPr>
+        <p:spPr>
+          <a:xfrm flipH="1" flipV="1">
+            <a:off x="6154824" y="4263745"/>
+            <a:ext cx="788142" cy="1138569"/>
+          </a:xfrm>
+          <a:prstGeom prst="straightConnector1">
+            <a:avLst/>
+          </a:prstGeom>
+          <a:ln w="19050">
+            <a:solidFill>
+              <a:srgbClr val="0000FF"/>
+            </a:solidFill>
+            <a:tailEnd type="triangle"/>
+          </a:ln>
+        </p:spPr>
+        <p:style>
+          <a:lnRef idx="1">
+            <a:schemeClr val="accent1"/>
+          </a:lnRef>
+          <a:fillRef idx="0">
+            <a:schemeClr val="accent1"/>
+          </a:fillRef>
+          <a:effectRef idx="0">
+            <a:schemeClr val="accent1"/>
+          </a:effectRef>
+          <a:fontRef idx="minor">
+            <a:schemeClr val="tx1"/>
+          </a:fontRef>
+        </p:style>
+      </p:cxnSp>
+    </p:spTree>
+    <p:extLst>
+      <p:ext uri="{BB962C8B-B14F-4D97-AF65-F5344CB8AC3E}">
+        <p14:creationId xmlns:p14="http://schemas.microsoft.com/office/powerpoint/2010/main" val="3195756581"/>
+      </p:ext>
+    </p:extLst>
+  </p:cSld>
+  <p:clrMapOvr>
+    <a:masterClrMapping/>
+  </p:clrMapOvr>
+</p:sld>
+</file>
+
 <file path=ppt/theme/theme1.xml><?xml version="1.0" encoding="utf-8"?>
 <a:theme xmlns:a="http://schemas.openxmlformats.org/drawingml/2006/main" name="Office Theme">
   <a:themeElements>

</xml_diff>

<commit_message>
Fix end balance text box on Participant dashboard figure
</commit_message>
<xml_diff>
--- a/LakeMeadWaterBankDivideInflow/ModelGuide/ModelGuideSlides.pptx
+++ b/LakeMeadWaterBankDivideInflow/ModelGuide/ModelGuideSlides.pptx
@@ -3988,7 +3988,7 @@
         <p:spPr>
           <a:xfrm>
             <a:off x="6493069" y="5668481"/>
-            <a:ext cx="3440463" cy="646331"/>
+            <a:ext cx="4601112" cy="369332"/>
           </a:xfrm>
           <a:prstGeom prst="rect">
             <a:avLst/>
@@ -4008,7 +4008,7 @@
                   <a:srgbClr val="FF9900"/>
                 </a:solidFill>
               </a:rPr>
-              <a:t>g. End balance = Available water - Withdraw.</a:t>
+              <a:t>g. End balance = Available water ― Withdraw.</a:t>
             </a:r>
           </a:p>
         </p:txBody>

</xml_diff>